<commit_message>
CMSB2012 Paper: latest version.
</commit_message>
<xml_diff>
--- a/doc/publications/2012-04_CMSB2012/figures/Conversion.pptx
+++ b/doc/publications/2012-04_CMSB2012/figures/Conversion.pptx
@@ -195,7 +195,7 @@
             <a:fld id="{AEBA95E1-29A5-4C92-A114-356173FFE1B7}" type="datetimeFigureOut">
               <a:rPr lang="en-US" smtClean="0"/>
               <a:pPr/>
-              <a:t>4/18/2012</a:t>
+              <a:t>4/19/2012</a:t>
             </a:fld>
             <a:endParaRPr lang="en-US"/>
           </a:p>
@@ -830,7 +830,7 @@
             <a:fld id="{7FFB8D8C-A3C7-4ABD-A7A4-8E27FCE4E604}" type="datetimeFigureOut">
               <a:rPr lang="de-DE" smtClean="0"/>
               <a:pPr/>
-              <a:t>18.04.2012</a:t>
+              <a:t>19.04.2012</a:t>
             </a:fld>
             <a:endParaRPr lang="de-DE"/>
           </a:p>
@@ -997,7 +997,7 @@
             <a:fld id="{7FFB8D8C-A3C7-4ABD-A7A4-8E27FCE4E604}" type="datetimeFigureOut">
               <a:rPr lang="de-DE" smtClean="0"/>
               <a:pPr/>
-              <a:t>18.04.2012</a:t>
+              <a:t>19.04.2012</a:t>
             </a:fld>
             <a:endParaRPr lang="de-DE"/>
           </a:p>
@@ -1174,7 +1174,7 @@
             <a:fld id="{7FFB8D8C-A3C7-4ABD-A7A4-8E27FCE4E604}" type="datetimeFigureOut">
               <a:rPr lang="de-DE" smtClean="0"/>
               <a:pPr/>
-              <a:t>18.04.2012</a:t>
+              <a:t>19.04.2012</a:t>
             </a:fld>
             <a:endParaRPr lang="de-DE"/>
           </a:p>
@@ -1341,7 +1341,7 @@
             <a:fld id="{7FFB8D8C-A3C7-4ABD-A7A4-8E27FCE4E604}" type="datetimeFigureOut">
               <a:rPr lang="de-DE" smtClean="0"/>
               <a:pPr/>
-              <a:t>18.04.2012</a:t>
+              <a:t>19.04.2012</a:t>
             </a:fld>
             <a:endParaRPr lang="de-DE"/>
           </a:p>
@@ -1584,7 +1584,7 @@
             <a:fld id="{7FFB8D8C-A3C7-4ABD-A7A4-8E27FCE4E604}" type="datetimeFigureOut">
               <a:rPr lang="de-DE" smtClean="0"/>
               <a:pPr/>
-              <a:t>18.04.2012</a:t>
+              <a:t>19.04.2012</a:t>
             </a:fld>
             <a:endParaRPr lang="de-DE"/>
           </a:p>
@@ -1869,7 +1869,7 @@
             <a:fld id="{7FFB8D8C-A3C7-4ABD-A7A4-8E27FCE4E604}" type="datetimeFigureOut">
               <a:rPr lang="de-DE" smtClean="0"/>
               <a:pPr/>
-              <a:t>18.04.2012</a:t>
+              <a:t>19.04.2012</a:t>
             </a:fld>
             <a:endParaRPr lang="de-DE"/>
           </a:p>
@@ -2288,7 +2288,7 @@
             <a:fld id="{7FFB8D8C-A3C7-4ABD-A7A4-8E27FCE4E604}" type="datetimeFigureOut">
               <a:rPr lang="de-DE" smtClean="0"/>
               <a:pPr/>
-              <a:t>18.04.2012</a:t>
+              <a:t>19.04.2012</a:t>
             </a:fld>
             <a:endParaRPr lang="de-DE"/>
           </a:p>
@@ -2403,7 +2403,7 @@
             <a:fld id="{7FFB8D8C-A3C7-4ABD-A7A4-8E27FCE4E604}" type="datetimeFigureOut">
               <a:rPr lang="de-DE" smtClean="0"/>
               <a:pPr/>
-              <a:t>18.04.2012</a:t>
+              <a:t>19.04.2012</a:t>
             </a:fld>
             <a:endParaRPr lang="de-DE"/>
           </a:p>
@@ -2495,7 +2495,7 @@
             <a:fld id="{7FFB8D8C-A3C7-4ABD-A7A4-8E27FCE4E604}" type="datetimeFigureOut">
               <a:rPr lang="de-DE" smtClean="0"/>
               <a:pPr/>
-              <a:t>18.04.2012</a:t>
+              <a:t>19.04.2012</a:t>
             </a:fld>
             <a:endParaRPr lang="de-DE"/>
           </a:p>
@@ -2769,7 +2769,7 @@
             <a:fld id="{7FFB8D8C-A3C7-4ABD-A7A4-8E27FCE4E604}" type="datetimeFigureOut">
               <a:rPr lang="de-DE" smtClean="0"/>
               <a:pPr/>
-              <a:t>18.04.2012</a:t>
+              <a:t>19.04.2012</a:t>
             </a:fld>
             <a:endParaRPr lang="de-DE"/>
           </a:p>
@@ -3019,7 +3019,7 @@
             <a:fld id="{7FFB8D8C-A3C7-4ABD-A7A4-8E27FCE4E604}" type="datetimeFigureOut">
               <a:rPr lang="de-DE" smtClean="0"/>
               <a:pPr/>
-              <a:t>18.04.2012</a:t>
+              <a:t>19.04.2012</a:t>
             </a:fld>
             <a:endParaRPr lang="de-DE"/>
           </a:p>
@@ -3229,7 +3229,7 @@
             <a:fld id="{7FFB8D8C-A3C7-4ABD-A7A4-8E27FCE4E604}" type="datetimeFigureOut">
               <a:rPr lang="de-DE" smtClean="0"/>
               <a:pPr/>
-              <a:t>18.04.2012</a:t>
+              <a:t>19.04.2012</a:t>
             </a:fld>
             <a:endParaRPr lang="de-DE"/>
           </a:p>
@@ -9149,7 +9149,7 @@
         </p:nvSpPr>
         <p:spPr>
           <a:xfrm>
-            <a:off x="3933618" y="142852"/>
+            <a:off x="3934800" y="142852"/>
             <a:ext cx="1571636" cy="214314"/>
           </a:xfrm>
           <a:prstGeom prst="roundRect">
@@ -9243,7 +9243,7 @@
         </p:nvSpPr>
         <p:spPr>
           <a:xfrm>
-            <a:off x="3933618" y="500042"/>
+            <a:off x="3934800" y="500042"/>
             <a:ext cx="1571636" cy="214314"/>
           </a:xfrm>
           <a:prstGeom prst="roundRect">
@@ -9288,7 +9288,7 @@
         </p:nvSpPr>
         <p:spPr>
           <a:xfrm>
-            <a:off x="3933618" y="785794"/>
+            <a:off x="3934800" y="785794"/>
             <a:ext cx="1571636" cy="214314"/>
           </a:xfrm>
           <a:prstGeom prst="roundRect">
@@ -9333,8 +9333,8 @@
         </p:nvSpPr>
         <p:spPr>
           <a:xfrm>
-            <a:off x="4005658" y="2643182"/>
-            <a:ext cx="1571034" cy="214314"/>
+            <a:off x="3934800" y="2643182"/>
+            <a:ext cx="1573200" cy="214314"/>
           </a:xfrm>
           <a:prstGeom prst="roundRect">
             <a:avLst/>
@@ -9471,7 +9471,7 @@
         </p:nvSpPr>
         <p:spPr>
           <a:xfrm>
-            <a:off x="3931338" y="1761378"/>
+            <a:off x="3934800" y="1761378"/>
             <a:ext cx="2000264" cy="214314"/>
           </a:xfrm>
           <a:prstGeom prst="roundRect">
@@ -9516,7 +9516,7 @@
         </p:nvSpPr>
         <p:spPr>
           <a:xfrm>
-            <a:off x="3929058" y="1475626"/>
+            <a:off x="3934800" y="1475626"/>
             <a:ext cx="2000264" cy="214314"/>
           </a:xfrm>
           <a:prstGeom prst="roundRect">
@@ -9601,7 +9601,7 @@
         </p:nvSpPr>
         <p:spPr>
           <a:xfrm>
-            <a:off x="4005056" y="2928934"/>
+            <a:off x="3934800" y="2928934"/>
             <a:ext cx="1573346" cy="214314"/>
           </a:xfrm>
           <a:prstGeom prst="roundRect">
@@ -9611,7 +9611,7 @@
             <a:srgbClr val="F7FAFF"/>
           </a:solidFill>
           <a:ln>
-            <a:prstDash val="sysDash"/>
+            <a:prstDash val="sysDot"/>
           </a:ln>
         </p:spPr>
         <p:style>
@@ -9684,7 +9684,7 @@
         </p:nvSpPr>
         <p:spPr>
           <a:xfrm>
-            <a:off x="3931338" y="1071546"/>
+            <a:off x="3934800" y="1071546"/>
             <a:ext cx="1571636" cy="214314"/>
           </a:xfrm>
           <a:prstGeom prst="roundRect">
@@ -9806,7 +9806,7 @@
             <a:avLst/>
           </a:prstGeom>
           <a:ln w="12700">
-            <a:prstDash val="dash"/>
+            <a:prstDash val="sysDot"/>
           </a:ln>
         </p:spPr>
         <p:style>
@@ -10490,8 +10490,8 @@
         </p:nvCxnSpPr>
         <p:spPr>
           <a:xfrm>
-            <a:off x="5505254" y="250009"/>
-            <a:ext cx="2281456" cy="1069191"/>
+            <a:off x="5506436" y="250009"/>
+            <a:ext cx="2280274" cy="1069191"/>
           </a:xfrm>
           <a:prstGeom prst="line">
             <a:avLst/>
@@ -10526,8 +10526,8 @@
         </p:nvCxnSpPr>
         <p:spPr>
           <a:xfrm>
-            <a:off x="5505254" y="607199"/>
-            <a:ext cx="363789" cy="572605"/>
+            <a:off x="5506436" y="607199"/>
+            <a:ext cx="362607" cy="572605"/>
           </a:xfrm>
           <a:prstGeom prst="line">
             <a:avLst/>
@@ -10604,8 +10604,8 @@
         </p:nvCxnSpPr>
         <p:spPr>
           <a:xfrm>
-            <a:off x="5505254" y="892951"/>
-            <a:ext cx="363789" cy="286853"/>
+            <a:off x="5506436" y="892951"/>
+            <a:ext cx="362607" cy="286853"/>
           </a:xfrm>
           <a:prstGeom prst="line">
             <a:avLst/>
@@ -10640,8 +10640,8 @@
         </p:nvCxnSpPr>
         <p:spPr>
           <a:xfrm>
-            <a:off x="5502974" y="1178703"/>
-            <a:ext cx="366069" cy="1101"/>
+            <a:off x="5506436" y="1178703"/>
+            <a:ext cx="362607" cy="1101"/>
           </a:xfrm>
           <a:prstGeom prst="line">
             <a:avLst/>
@@ -10717,9 +10717,9 @@
           <p:nvPr/>
         </p:nvCxnSpPr>
         <p:spPr>
-          <a:xfrm rot="16200000" flipH="1">
-            <a:off x="4991107" y="1916054"/>
-            <a:ext cx="134831" cy="254105"/>
+          <a:xfrm>
+            <a:off x="4934932" y="1975692"/>
+            <a:ext cx="250643" cy="134831"/>
           </a:xfrm>
           <a:prstGeom prst="line">
             <a:avLst/>
@@ -11018,7 +11018,7 @@
         <p:spPr>
           <a:xfrm>
             <a:off x="1857356" y="250009"/>
-            <a:ext cx="2076262" cy="0"/>
+            <a:ext cx="2077444" cy="0"/>
           </a:xfrm>
           <a:prstGeom prst="line">
             <a:avLst/>
@@ -11052,7 +11052,7 @@
         <p:spPr>
           <a:xfrm flipV="1">
             <a:off x="3000364" y="607199"/>
-            <a:ext cx="933254" cy="142876"/>
+            <a:ext cx="934436" cy="142876"/>
           </a:xfrm>
           <a:prstGeom prst="line">
             <a:avLst/>
@@ -11086,7 +11086,7 @@
         <p:spPr>
           <a:xfrm>
             <a:off x="3000364" y="750075"/>
-            <a:ext cx="933254" cy="142876"/>
+            <a:ext cx="934436" cy="142876"/>
           </a:xfrm>
           <a:prstGeom prst="line">
             <a:avLst/>
@@ -11120,7 +11120,7 @@
         <p:spPr>
           <a:xfrm>
             <a:off x="3000364" y="750075"/>
-            <a:ext cx="930974" cy="428628"/>
+            <a:ext cx="934436" cy="428628"/>
           </a:xfrm>
           <a:prstGeom prst="line">
             <a:avLst/>
@@ -11154,7 +11154,7 @@
         <p:spPr>
           <a:xfrm>
             <a:off x="2998616" y="1582783"/>
-            <a:ext cx="932722" cy="285752"/>
+            <a:ext cx="936184" cy="285752"/>
           </a:xfrm>
           <a:prstGeom prst="line">
             <a:avLst/>
@@ -11188,7 +11188,7 @@
         <p:spPr>
           <a:xfrm>
             <a:off x="2998616" y="1582783"/>
-            <a:ext cx="930442" cy="0"/>
+            <a:ext cx="936184" cy="0"/>
           </a:xfrm>
           <a:prstGeom prst="line">
             <a:avLst/>
@@ -11270,7 +11270,7 @@
         <p:spPr>
           <a:xfrm>
             <a:off x="2999346" y="2312294"/>
-            <a:ext cx="1006312" cy="438045"/>
+            <a:ext cx="935454" cy="438045"/>
           </a:xfrm>
           <a:prstGeom prst="line">
             <a:avLst/>
@@ -11306,13 +11306,13 @@
         <p:spPr>
           <a:xfrm>
             <a:off x="2999346" y="2312294"/>
-            <a:ext cx="1005710" cy="723797"/>
+            <a:ext cx="935454" cy="723797"/>
           </a:xfrm>
           <a:prstGeom prst="line">
             <a:avLst/>
           </a:prstGeom>
           <a:ln w="12700">
-            <a:prstDash val="dash"/>
+            <a:prstDash val="sysDot"/>
           </a:ln>
         </p:spPr>
         <p:style>
@@ -11375,8 +11375,8 @@
         </p:nvCxnSpPr>
         <p:spPr>
           <a:xfrm>
-            <a:off x="5700322" y="2768620"/>
-            <a:ext cx="443314" cy="410347"/>
+            <a:off x="5616104" y="2762920"/>
+            <a:ext cx="527532" cy="416047"/>
           </a:xfrm>
           <a:prstGeom prst="line">
             <a:avLst/>
@@ -11411,7 +11411,7 @@
         </p:nvSpPr>
         <p:spPr>
           <a:xfrm>
-            <a:off x="5592322" y="2714620"/>
+            <a:off x="5508104" y="2708920"/>
             <a:ext cx="108000" cy="108000"/>
           </a:xfrm>
           <a:prstGeom prst="diamond">
@@ -11534,7 +11534,7 @@
             <a:avLst/>
           </a:prstGeom>
           <a:ln>
-            <a:prstDash val="sysDash"/>
+            <a:prstDash val="sysDot"/>
             <a:headEnd type="none"/>
           </a:ln>
         </p:spPr>
@@ -11571,7 +11571,7 @@
             <a:avLst/>
           </a:prstGeom>
           <a:ln>
-            <a:prstDash val="sysDash"/>
+            <a:prstDash val="sysDot"/>
             <a:headEnd type="none"/>
           </a:ln>
         </p:spPr>
@@ -11602,7 +11602,7 @@
         <p:spPr>
           <a:xfrm flipV="1">
             <a:off x="3000364" y="250009"/>
-            <a:ext cx="933254" cy="500066"/>
+            <a:ext cx="934436" cy="500066"/>
           </a:xfrm>
           <a:prstGeom prst="line">
             <a:avLst/>
@@ -11635,8 +11635,8 @@
         </p:nvCxnSpPr>
         <p:spPr>
           <a:xfrm>
-            <a:off x="5700322" y="3038742"/>
-            <a:ext cx="443314" cy="140225"/>
+            <a:off x="5636490" y="3038742"/>
+            <a:ext cx="507146" cy="140225"/>
           </a:xfrm>
           <a:prstGeom prst="line">
             <a:avLst/>
@@ -11671,7 +11671,7 @@
         </p:nvSpPr>
         <p:spPr>
           <a:xfrm>
-            <a:off x="5592322" y="2984742"/>
+            <a:off x="5528490" y="2984742"/>
             <a:ext cx="108000" cy="108000"/>
           </a:xfrm>
           <a:prstGeom prst="diamond">
@@ -11804,8 +11804,8 @@
         </p:nvCxnSpPr>
         <p:spPr>
           <a:xfrm>
-            <a:off x="5929322" y="1582783"/>
-            <a:ext cx="464514" cy="225819"/>
+            <a:off x="5935064" y="1582783"/>
+            <a:ext cx="458772" cy="225819"/>
           </a:xfrm>
           <a:prstGeom prst="line">
             <a:avLst/>
@@ -14429,7 +14429,38 @@
       </a:bgFillStyleLst>
     </a:fmtScheme>
   </a:themeElements>
-  <a:objectDefaults/>
+  <a:objectDefaults>
+    <a:spDef>
+      <a:spPr>
+        <a:solidFill>
+          <a:srgbClr val="F7FAFF"/>
+        </a:solidFill>
+        <a:ln>
+          <a:prstDash val="sysDash"/>
+        </a:ln>
+      </a:spPr>
+      <a:bodyPr rtlCol="0" anchor="ctr"/>
+      <a:lstStyle>
+        <a:defPPr algn="ctr">
+          <a:defRPr sz="1200" dirty="0" err="1" smtClean="0"/>
+        </a:defPPr>
+      </a:lstStyle>
+      <a:style>
+        <a:lnRef idx="2">
+          <a:schemeClr val="accent1"/>
+        </a:lnRef>
+        <a:fillRef idx="1">
+          <a:schemeClr val="lt1"/>
+        </a:fillRef>
+        <a:effectRef idx="0">
+          <a:schemeClr val="accent1"/>
+        </a:effectRef>
+        <a:fontRef idx="minor">
+          <a:schemeClr val="dk1"/>
+        </a:fontRef>
+      </a:style>
+    </a:spDef>
+  </a:objectDefaults>
   <a:extraClrSchemeLst/>
 </a:theme>
 </file>

</xml_diff>

<commit_message>
Method Publication: Some correction to the figures (need still to be revised and exported)
</commit_message>
<xml_diff>
--- a/doc/publications/2012-04_CMSB2012/figures/Conversion.pptx
+++ b/doc/publications/2012-04_CMSB2012/figures/Conversion.pptx
@@ -195,7 +195,7 @@
             <a:fld id="{AEBA95E1-29A5-4C92-A114-356173FFE1B7}" type="datetimeFigureOut">
               <a:rPr lang="en-US" smtClean="0"/>
               <a:pPr/>
-              <a:t>4/19/2012</a:t>
+              <a:t>5/25/2012</a:t>
             </a:fld>
             <a:endParaRPr lang="en-US"/>
           </a:p>
@@ -830,7 +830,7 @@
             <a:fld id="{7FFB8D8C-A3C7-4ABD-A7A4-8E27FCE4E604}" type="datetimeFigureOut">
               <a:rPr lang="de-DE" smtClean="0"/>
               <a:pPr/>
-              <a:t>19.04.2012</a:t>
+              <a:t>25.05.2012</a:t>
             </a:fld>
             <a:endParaRPr lang="de-DE"/>
           </a:p>
@@ -997,7 +997,7 @@
             <a:fld id="{7FFB8D8C-A3C7-4ABD-A7A4-8E27FCE4E604}" type="datetimeFigureOut">
               <a:rPr lang="de-DE" smtClean="0"/>
               <a:pPr/>
-              <a:t>19.04.2012</a:t>
+              <a:t>25.05.2012</a:t>
             </a:fld>
             <a:endParaRPr lang="de-DE"/>
           </a:p>
@@ -1174,7 +1174,7 @@
             <a:fld id="{7FFB8D8C-A3C7-4ABD-A7A4-8E27FCE4E604}" type="datetimeFigureOut">
               <a:rPr lang="de-DE" smtClean="0"/>
               <a:pPr/>
-              <a:t>19.04.2012</a:t>
+              <a:t>25.05.2012</a:t>
             </a:fld>
             <a:endParaRPr lang="de-DE"/>
           </a:p>
@@ -1341,7 +1341,7 @@
             <a:fld id="{7FFB8D8C-A3C7-4ABD-A7A4-8E27FCE4E604}" type="datetimeFigureOut">
               <a:rPr lang="de-DE" smtClean="0"/>
               <a:pPr/>
-              <a:t>19.04.2012</a:t>
+              <a:t>25.05.2012</a:t>
             </a:fld>
             <a:endParaRPr lang="de-DE"/>
           </a:p>
@@ -1584,7 +1584,7 @@
             <a:fld id="{7FFB8D8C-A3C7-4ABD-A7A4-8E27FCE4E604}" type="datetimeFigureOut">
               <a:rPr lang="de-DE" smtClean="0"/>
               <a:pPr/>
-              <a:t>19.04.2012</a:t>
+              <a:t>25.05.2012</a:t>
             </a:fld>
             <a:endParaRPr lang="de-DE"/>
           </a:p>
@@ -1869,7 +1869,7 @@
             <a:fld id="{7FFB8D8C-A3C7-4ABD-A7A4-8E27FCE4E604}" type="datetimeFigureOut">
               <a:rPr lang="de-DE" smtClean="0"/>
               <a:pPr/>
-              <a:t>19.04.2012</a:t>
+              <a:t>25.05.2012</a:t>
             </a:fld>
             <a:endParaRPr lang="de-DE"/>
           </a:p>
@@ -2288,7 +2288,7 @@
             <a:fld id="{7FFB8D8C-A3C7-4ABD-A7A4-8E27FCE4E604}" type="datetimeFigureOut">
               <a:rPr lang="de-DE" smtClean="0"/>
               <a:pPr/>
-              <a:t>19.04.2012</a:t>
+              <a:t>25.05.2012</a:t>
             </a:fld>
             <a:endParaRPr lang="de-DE"/>
           </a:p>
@@ -2403,7 +2403,7 @@
             <a:fld id="{7FFB8D8C-A3C7-4ABD-A7A4-8E27FCE4E604}" type="datetimeFigureOut">
               <a:rPr lang="de-DE" smtClean="0"/>
               <a:pPr/>
-              <a:t>19.04.2012</a:t>
+              <a:t>25.05.2012</a:t>
             </a:fld>
             <a:endParaRPr lang="de-DE"/>
           </a:p>
@@ -2495,7 +2495,7 @@
             <a:fld id="{7FFB8D8C-A3C7-4ABD-A7A4-8E27FCE4E604}" type="datetimeFigureOut">
               <a:rPr lang="de-DE" smtClean="0"/>
               <a:pPr/>
-              <a:t>19.04.2012</a:t>
+              <a:t>25.05.2012</a:t>
             </a:fld>
             <a:endParaRPr lang="de-DE"/>
           </a:p>
@@ -2769,7 +2769,7 @@
             <a:fld id="{7FFB8D8C-A3C7-4ABD-A7A4-8E27FCE4E604}" type="datetimeFigureOut">
               <a:rPr lang="de-DE" smtClean="0"/>
               <a:pPr/>
-              <a:t>19.04.2012</a:t>
+              <a:t>25.05.2012</a:t>
             </a:fld>
             <a:endParaRPr lang="de-DE"/>
           </a:p>
@@ -3019,7 +3019,7 @@
             <a:fld id="{7FFB8D8C-A3C7-4ABD-A7A4-8E27FCE4E604}" type="datetimeFigureOut">
               <a:rPr lang="de-DE" smtClean="0"/>
               <a:pPr/>
-              <a:t>19.04.2012</a:t>
+              <a:t>25.05.2012</a:t>
             </a:fld>
             <a:endParaRPr lang="de-DE"/>
           </a:p>
@@ -3229,7 +3229,7 @@
             <a:fld id="{7FFB8D8C-A3C7-4ABD-A7A4-8E27FCE4E604}" type="datetimeFigureOut">
               <a:rPr lang="de-DE" smtClean="0"/>
               <a:pPr/>
-              <a:t>19.04.2012</a:t>
+              <a:t>25.05.2012</a:t>
             </a:fld>
             <a:endParaRPr lang="de-DE"/>
           </a:p>
@@ -9832,7 +9832,7 @@
         </p:nvSpPr>
         <p:spPr>
           <a:xfrm>
-            <a:off x="7608184" y="564913"/>
+            <a:off x="7606800" y="583961"/>
             <a:ext cx="982961" cy="230832"/>
           </a:xfrm>
           <a:prstGeom prst="rect">
@@ -9870,7 +9870,7 @@
         </p:nvSpPr>
         <p:spPr>
           <a:xfrm>
-            <a:off x="7608184" y="736307"/>
+            <a:off x="7606800" y="736307"/>
             <a:ext cx="963725" cy="230832"/>
           </a:xfrm>
           <a:prstGeom prst="rect">
@@ -9904,7 +9904,7 @@
         </p:nvSpPr>
         <p:spPr>
           <a:xfrm>
-            <a:off x="7608184" y="279161"/>
+            <a:off x="7606800" y="279161"/>
             <a:ext cx="720069" cy="230832"/>
           </a:xfrm>
           <a:prstGeom prst="rect">
@@ -9975,7 +9975,7 @@
         </p:nvSpPr>
         <p:spPr>
           <a:xfrm>
-            <a:off x="7608184" y="128693"/>
+            <a:off x="7606800" y="128693"/>
             <a:ext cx="1484702" cy="230832"/>
           </a:xfrm>
           <a:prstGeom prst="rect">
@@ -10178,7 +10178,7 @@
         </p:nvSpPr>
         <p:spPr>
           <a:xfrm>
-            <a:off x="7602495" y="431561"/>
+            <a:off x="7606800" y="431561"/>
             <a:ext cx="798617" cy="230832"/>
           </a:xfrm>
           <a:prstGeom prst="rect">
@@ -11490,7 +11490,7 @@
         </p:nvSpPr>
         <p:spPr>
           <a:xfrm>
-            <a:off x="7613208" y="888707"/>
+            <a:off x="7606800" y="888707"/>
             <a:ext cx="963725" cy="230832"/>
           </a:xfrm>
           <a:prstGeom prst="rect">
@@ -12509,7 +12509,7 @@
         <p:spPr>
           <a:xfrm>
             <a:off x="6143636" y="1214422"/>
-            <a:ext cx="1143008" cy="214314"/>
+            <a:ext cx="1357200" cy="214314"/>
           </a:xfrm>
           <a:prstGeom prst="roundRect">
             <a:avLst/>
@@ -12554,7 +12554,7 @@
         <p:spPr>
           <a:xfrm>
             <a:off x="6143636" y="2000240"/>
-            <a:ext cx="1143008" cy="214314"/>
+            <a:ext cx="1357200" cy="214314"/>
           </a:xfrm>
           <a:prstGeom prst="roundRect">
             <a:avLst/>
@@ -12584,7 +12584,7 @@
             <a:pPr algn="ctr"/>
             <a:r>
               <a:rPr lang="de-DE" sz="1200" dirty="0" err="1" smtClean="0"/>
-              <a:t>listOfReaction</a:t>
+              <a:t>listOfReactions</a:t>
             </a:r>
             <a:endParaRPr lang="de-DE" sz="1200" dirty="0"/>
           </a:p>
@@ -12878,7 +12878,7 @@
         <p:spPr>
           <a:xfrm>
             <a:off x="6143636" y="2349615"/>
-            <a:ext cx="1143008" cy="214314"/>
+            <a:ext cx="1357200" cy="214314"/>
           </a:xfrm>
           <a:prstGeom prst="roundRect">
             <a:avLst/>
@@ -12911,7 +12911,7 @@
             <a:pPr algn="ctr"/>
             <a:r>
               <a:rPr lang="de-DE" sz="1200" dirty="0" err="1" smtClean="0"/>
-              <a:t>listOfTransition</a:t>
+              <a:t>listOfTransitions</a:t>
             </a:r>
             <a:endParaRPr lang="de-DE" sz="1200" dirty="0"/>
           </a:p>
@@ -12975,9 +12975,9 @@
           <p:nvPr/>
         </p:nvCxnSpPr>
         <p:spPr>
-          <a:xfrm rot="10800000">
-            <a:off x="7286644" y="1321579"/>
-            <a:ext cx="801448" cy="65716"/>
+          <a:xfrm flipH="1" flipV="1">
+            <a:off x="7500836" y="1321579"/>
+            <a:ext cx="587256" cy="65716"/>
           </a:xfrm>
           <a:prstGeom prst="line">
             <a:avLst/>
@@ -13011,9 +13011,9 @@
           <p:nvPr/>
         </p:nvCxnSpPr>
         <p:spPr>
-          <a:xfrm rot="5400000">
-            <a:off x="7597604" y="1291187"/>
-            <a:ext cx="505251" cy="1127169"/>
+          <a:xfrm flipH="1">
+            <a:off x="7500836" y="1602146"/>
+            <a:ext cx="912977" cy="505251"/>
           </a:xfrm>
           <a:prstGeom prst="line">
             <a:avLst/>
@@ -13119,9 +13119,9 @@
           <p:nvPr/>
         </p:nvCxnSpPr>
         <p:spPr>
-          <a:xfrm rot="5400000">
-            <a:off x="7422916" y="1465875"/>
-            <a:ext cx="854626" cy="1127169"/>
+          <a:xfrm flipH="1">
+            <a:off x="7500836" y="1602146"/>
+            <a:ext cx="912977" cy="854626"/>
           </a:xfrm>
           <a:prstGeom prst="line">
             <a:avLst/>
@@ -13617,7 +13617,7 @@
         </p:nvSpPr>
         <p:spPr>
           <a:xfrm>
-            <a:off x="7902778" y="769276"/>
+            <a:off x="7898400" y="778800"/>
             <a:ext cx="982961" cy="230832"/>
           </a:xfrm>
           <a:prstGeom prst="rect">
@@ -13655,7 +13655,7 @@
         </p:nvSpPr>
         <p:spPr>
           <a:xfrm>
-            <a:off x="7902778" y="483524"/>
+            <a:off x="7898400" y="483524"/>
             <a:ext cx="720069" cy="230832"/>
           </a:xfrm>
           <a:prstGeom prst="rect">
@@ -13778,8 +13778,8 @@
         </p:nvSpPr>
         <p:spPr>
           <a:xfrm>
-            <a:off x="7902778" y="308741"/>
-            <a:ext cx="1095172" cy="230832"/>
+            <a:off x="7898400" y="308741"/>
+            <a:ext cx="1350050" cy="230832"/>
           </a:xfrm>
           <a:prstGeom prst="rect">
             <a:avLst/>
@@ -13798,7 +13798,7 @@
             </a:r>
             <a:r>
               <a:rPr lang="de-DE" sz="900" dirty="0" err="1" smtClean="0"/>
-              <a:t>qual</a:t>
+              <a:t>extension</a:t>
             </a:r>
             <a:r>
               <a:rPr lang="de-DE" sz="900" dirty="0" smtClean="0"/>
@@ -13820,7 +13820,7 @@
         </p:nvSpPr>
         <p:spPr>
           <a:xfrm>
-            <a:off x="7902778" y="126334"/>
+            <a:off x="7898400" y="126334"/>
             <a:ext cx="1098378" cy="230832"/>
           </a:xfrm>
           <a:prstGeom prst="rect">
@@ -14039,7 +14039,7 @@
         </p:nvSpPr>
         <p:spPr>
           <a:xfrm>
-            <a:off x="7897089" y="635924"/>
+            <a:off x="7898400" y="635924"/>
             <a:ext cx="798617" cy="230832"/>
           </a:xfrm>
           <a:prstGeom prst="rect">
@@ -14143,6 +14143,218 @@
           </a:p>
         </p:txBody>
       </p:sp>
+      <p:sp>
+        <p:nvSpPr>
+          <p:cNvPr id="62" name="Abgerundetes Rechteck 61"/>
+          <p:cNvSpPr/>
+          <p:nvPr/>
+        </p:nvSpPr>
+        <p:spPr>
+          <a:xfrm>
+            <a:off x="6139076" y="908720"/>
+            <a:ext cx="1357200" cy="214314"/>
+          </a:xfrm>
+          <a:prstGeom prst="roundRect">
+            <a:avLst/>
+          </a:prstGeom>
+          <a:solidFill>
+            <a:srgbClr val="F7F9F1"/>
+          </a:solidFill>
+          <a:ln>
+            <a:prstDash val="sysDash"/>
+          </a:ln>
+        </p:spPr>
+        <p:style>
+          <a:lnRef idx="2">
+            <a:schemeClr val="accent3"/>
+          </a:lnRef>
+          <a:fillRef idx="1">
+            <a:schemeClr val="lt1"/>
+          </a:fillRef>
+          <a:effectRef idx="0">
+            <a:schemeClr val="accent3"/>
+          </a:effectRef>
+          <a:fontRef idx="minor">
+            <a:schemeClr val="dk1"/>
+          </a:fontRef>
+        </p:style>
+        <p:txBody>
+          <a:bodyPr rtlCol="0" anchor="ctr"/>
+          <a:lstStyle/>
+          <a:p>
+            <a:pPr algn="ctr"/>
+            <a:r>
+              <a:rPr lang="en-US" sz="1200" dirty="0" err="1" smtClean="0"/>
+              <a:t>listOfGroups</a:t>
+            </a:r>
+            <a:endParaRPr lang="de-DE" sz="1200" dirty="0"/>
+          </a:p>
+        </p:txBody>
+      </p:sp>
+      <p:sp>
+        <p:nvSpPr>
+          <p:cNvPr id="63" name="Abgerundetes Rechteck 62"/>
+          <p:cNvSpPr/>
+          <p:nvPr/>
+        </p:nvSpPr>
+        <p:spPr>
+          <a:xfrm>
+            <a:off x="4427984" y="908720"/>
+            <a:ext cx="1357322" cy="214314"/>
+          </a:xfrm>
+          <a:prstGeom prst="roundRect">
+            <a:avLst/>
+          </a:prstGeom>
+          <a:solidFill>
+            <a:srgbClr val="F7F9F1"/>
+          </a:solidFill>
+          <a:ln>
+            <a:prstDash val="sysDash"/>
+          </a:ln>
+        </p:spPr>
+        <p:style>
+          <a:lnRef idx="2">
+            <a:schemeClr val="accent3"/>
+          </a:lnRef>
+          <a:fillRef idx="1">
+            <a:schemeClr val="lt1"/>
+          </a:fillRef>
+          <a:effectRef idx="0">
+            <a:schemeClr val="accent3"/>
+          </a:effectRef>
+          <a:fontRef idx="minor">
+            <a:schemeClr val="dk1"/>
+          </a:fontRef>
+        </p:style>
+        <p:txBody>
+          <a:bodyPr rtlCol="0" anchor="ctr"/>
+          <a:lstStyle/>
+          <a:p>
+            <a:pPr algn="ctr"/>
+            <a:r>
+              <a:rPr lang="de-DE" sz="1200" dirty="0" err="1" smtClean="0"/>
+              <a:t>group</a:t>
+            </a:r>
+            <a:endParaRPr lang="de-DE" sz="1200" dirty="0"/>
+          </a:p>
+        </p:txBody>
+      </p:sp>
+      <p:cxnSp>
+        <p:nvCxnSpPr>
+          <p:cNvPr id="64" name="Gerade Verbindung 63"/>
+          <p:cNvCxnSpPr>
+            <a:stCxn id="65" idx="1"/>
+            <a:endCxn id="63" idx="3"/>
+          </p:cNvCxnSpPr>
+          <p:nvPr/>
+        </p:nvCxnSpPr>
+        <p:spPr>
+          <a:xfrm rot="10800000">
+            <a:off x="5785306" y="1015878"/>
+            <a:ext cx="226524" cy="2651"/>
+          </a:xfrm>
+          <a:prstGeom prst="line">
+            <a:avLst/>
+          </a:prstGeom>
+          <a:ln>
+            <a:headEnd type="none"/>
+          </a:ln>
+        </p:spPr>
+        <p:style>
+          <a:lnRef idx="2">
+            <a:schemeClr val="accent3"/>
+          </a:lnRef>
+          <a:fillRef idx="1">
+            <a:schemeClr val="lt1"/>
+          </a:fillRef>
+          <a:effectRef idx="0">
+            <a:schemeClr val="accent3"/>
+          </a:effectRef>
+          <a:fontRef idx="minor">
+            <a:schemeClr val="dk1"/>
+          </a:fontRef>
+        </p:style>
+      </p:cxnSp>
+      <p:sp>
+        <p:nvSpPr>
+          <p:cNvPr id="65" name="Raute 64"/>
+          <p:cNvSpPr/>
+          <p:nvPr/>
+        </p:nvSpPr>
+        <p:spPr>
+          <a:xfrm>
+            <a:off x="6011830" y="964528"/>
+            <a:ext cx="108000" cy="108000"/>
+          </a:xfrm>
+          <a:prstGeom prst="diamond">
+            <a:avLst/>
+          </a:prstGeom>
+          <a:noFill/>
+          <a:ln w="25400">
+            <a:solidFill>
+              <a:schemeClr val="accent3"/>
+            </a:solidFill>
+          </a:ln>
+        </p:spPr>
+        <p:style>
+          <a:lnRef idx="2">
+            <a:schemeClr val="accent1">
+              <a:shade val="50000"/>
+            </a:schemeClr>
+          </a:lnRef>
+          <a:fillRef idx="1">
+            <a:schemeClr val="accent1"/>
+          </a:fillRef>
+          <a:effectRef idx="0">
+            <a:schemeClr val="accent1"/>
+          </a:effectRef>
+          <a:fontRef idx="minor">
+            <a:schemeClr val="lt1"/>
+          </a:fontRef>
+        </p:style>
+        <p:txBody>
+          <a:bodyPr rtlCol="0" anchor="ctr"/>
+          <a:lstStyle/>
+          <a:p>
+            <a:pPr algn="ctr"/>
+            <a:endParaRPr lang="de-DE"/>
+          </a:p>
+        </p:txBody>
+      </p:sp>
+      <p:cxnSp>
+        <p:nvCxnSpPr>
+          <p:cNvPr id="66" name="Gerade Verbindung 65"/>
+          <p:cNvCxnSpPr>
+            <a:stCxn id="314" idx="3"/>
+            <a:endCxn id="63" idx="1"/>
+          </p:cNvCxnSpPr>
+          <p:nvPr/>
+        </p:nvCxnSpPr>
+        <p:spPr>
+          <a:xfrm flipV="1">
+            <a:off x="3714744" y="1015877"/>
+            <a:ext cx="713240" cy="305702"/>
+          </a:xfrm>
+          <a:prstGeom prst="line">
+            <a:avLst/>
+          </a:prstGeom>
+          <a:ln w="12700"/>
+        </p:spPr>
+        <p:style>
+          <a:lnRef idx="1">
+            <a:schemeClr val="dk1"/>
+          </a:lnRef>
+          <a:fillRef idx="0">
+            <a:schemeClr val="dk1"/>
+          </a:fillRef>
+          <a:effectRef idx="0">
+            <a:schemeClr val="dk1"/>
+          </a:effectRef>
+          <a:fontRef idx="minor">
+            <a:schemeClr val="tx1"/>
+          </a:fontRef>
+        </p:style>
+      </p:cxnSp>
     </p:spTree>
   </p:cSld>
   <p:clrMapOvr>

</xml_diff>

<commit_message>
Changed conversion chart arrangement
</commit_message>
<xml_diff>
--- a/doc/publications/2012-04_CMSB2012/figures/Conversion.pptx
+++ b/doc/publications/2012-04_CMSB2012/figures/Conversion.pptx
@@ -195,7 +195,7 @@
             <a:fld id="{AEBA95E1-29A5-4C92-A114-356173FFE1B7}" type="datetimeFigureOut">
               <a:rPr lang="en-US" smtClean="0"/>
               <a:pPr/>
-              <a:t>5/25/2012</a:t>
+              <a:t>5/29/2012</a:t>
             </a:fld>
             <a:endParaRPr lang="en-US"/>
           </a:p>
@@ -830,7 +830,7 @@
             <a:fld id="{7FFB8D8C-A3C7-4ABD-A7A4-8E27FCE4E604}" type="datetimeFigureOut">
               <a:rPr lang="de-DE" smtClean="0"/>
               <a:pPr/>
-              <a:t>25.05.2012</a:t>
+              <a:t>29.05.2012</a:t>
             </a:fld>
             <a:endParaRPr lang="de-DE"/>
           </a:p>
@@ -997,7 +997,7 @@
             <a:fld id="{7FFB8D8C-A3C7-4ABD-A7A4-8E27FCE4E604}" type="datetimeFigureOut">
               <a:rPr lang="de-DE" smtClean="0"/>
               <a:pPr/>
-              <a:t>25.05.2012</a:t>
+              <a:t>29.05.2012</a:t>
             </a:fld>
             <a:endParaRPr lang="de-DE"/>
           </a:p>
@@ -1174,7 +1174,7 @@
             <a:fld id="{7FFB8D8C-A3C7-4ABD-A7A4-8E27FCE4E604}" type="datetimeFigureOut">
               <a:rPr lang="de-DE" smtClean="0"/>
               <a:pPr/>
-              <a:t>25.05.2012</a:t>
+              <a:t>29.05.2012</a:t>
             </a:fld>
             <a:endParaRPr lang="de-DE"/>
           </a:p>
@@ -1341,7 +1341,7 @@
             <a:fld id="{7FFB8D8C-A3C7-4ABD-A7A4-8E27FCE4E604}" type="datetimeFigureOut">
               <a:rPr lang="de-DE" smtClean="0"/>
               <a:pPr/>
-              <a:t>25.05.2012</a:t>
+              <a:t>29.05.2012</a:t>
             </a:fld>
             <a:endParaRPr lang="de-DE"/>
           </a:p>
@@ -1584,7 +1584,7 @@
             <a:fld id="{7FFB8D8C-A3C7-4ABD-A7A4-8E27FCE4E604}" type="datetimeFigureOut">
               <a:rPr lang="de-DE" smtClean="0"/>
               <a:pPr/>
-              <a:t>25.05.2012</a:t>
+              <a:t>29.05.2012</a:t>
             </a:fld>
             <a:endParaRPr lang="de-DE"/>
           </a:p>
@@ -1869,7 +1869,7 @@
             <a:fld id="{7FFB8D8C-A3C7-4ABD-A7A4-8E27FCE4E604}" type="datetimeFigureOut">
               <a:rPr lang="de-DE" smtClean="0"/>
               <a:pPr/>
-              <a:t>25.05.2012</a:t>
+              <a:t>29.05.2012</a:t>
             </a:fld>
             <a:endParaRPr lang="de-DE"/>
           </a:p>
@@ -2288,7 +2288,7 @@
             <a:fld id="{7FFB8D8C-A3C7-4ABD-A7A4-8E27FCE4E604}" type="datetimeFigureOut">
               <a:rPr lang="de-DE" smtClean="0"/>
               <a:pPr/>
-              <a:t>25.05.2012</a:t>
+              <a:t>29.05.2012</a:t>
             </a:fld>
             <a:endParaRPr lang="de-DE"/>
           </a:p>
@@ -2403,7 +2403,7 @@
             <a:fld id="{7FFB8D8C-A3C7-4ABD-A7A4-8E27FCE4E604}" type="datetimeFigureOut">
               <a:rPr lang="de-DE" smtClean="0"/>
               <a:pPr/>
-              <a:t>25.05.2012</a:t>
+              <a:t>29.05.2012</a:t>
             </a:fld>
             <a:endParaRPr lang="de-DE"/>
           </a:p>
@@ -2495,7 +2495,7 @@
             <a:fld id="{7FFB8D8C-A3C7-4ABD-A7A4-8E27FCE4E604}" type="datetimeFigureOut">
               <a:rPr lang="de-DE" smtClean="0"/>
               <a:pPr/>
-              <a:t>25.05.2012</a:t>
+              <a:t>29.05.2012</a:t>
             </a:fld>
             <a:endParaRPr lang="de-DE"/>
           </a:p>
@@ -2769,7 +2769,7 @@
             <a:fld id="{7FFB8D8C-A3C7-4ABD-A7A4-8E27FCE4E604}" type="datetimeFigureOut">
               <a:rPr lang="de-DE" smtClean="0"/>
               <a:pPr/>
-              <a:t>25.05.2012</a:t>
+              <a:t>29.05.2012</a:t>
             </a:fld>
             <a:endParaRPr lang="de-DE"/>
           </a:p>
@@ -3019,7 +3019,7 @@
             <a:fld id="{7FFB8D8C-A3C7-4ABD-A7A4-8E27FCE4E604}" type="datetimeFigureOut">
               <a:rPr lang="de-DE" smtClean="0"/>
               <a:pPr/>
-              <a:t>25.05.2012</a:t>
+              <a:t>29.05.2012</a:t>
             </a:fld>
             <a:endParaRPr lang="de-DE"/>
           </a:p>
@@ -3229,7 +3229,7 @@
             <a:fld id="{7FFB8D8C-A3C7-4ABD-A7A4-8E27FCE4E604}" type="datetimeFigureOut">
               <a:rPr lang="de-DE" smtClean="0"/>
               <a:pPr/>
-              <a:t>25.05.2012</a:t>
+              <a:t>29.05.2012</a:t>
             </a:fld>
             <a:endParaRPr lang="de-DE"/>
           </a:p>
@@ -11863,7 +11863,7 @@
         <p:spPr>
           <a:xfrm>
             <a:off x="1428728" y="71414"/>
-            <a:ext cx="2643206" cy="2714644"/>
+            <a:ext cx="2643206" cy="2786082"/>
           </a:xfrm>
           <a:prstGeom prst="roundRect">
             <a:avLst>
@@ -11950,7 +11950,7 @@
         </p:nvSpPr>
         <p:spPr>
           <a:xfrm>
-            <a:off x="1500166" y="2404277"/>
+            <a:off x="1500166" y="2500306"/>
             <a:ext cx="1571636" cy="381781"/>
           </a:xfrm>
           <a:prstGeom prst="rect">
@@ -11988,7 +11988,7 @@
         </p:nvSpPr>
         <p:spPr>
           <a:xfrm>
-            <a:off x="2928926" y="1214422"/>
+            <a:off x="2928926" y="1448686"/>
             <a:ext cx="785818" cy="214314"/>
           </a:xfrm>
           <a:prstGeom prst="roundRect">
@@ -12030,7 +12030,7 @@
         </p:nvSpPr>
         <p:spPr>
           <a:xfrm>
-            <a:off x="2928926" y="2348512"/>
+            <a:off x="2928926" y="2427182"/>
             <a:ext cx="784800" cy="216000"/>
           </a:xfrm>
           <a:prstGeom prst="roundRect">
@@ -12072,7 +12072,7 @@
         </p:nvSpPr>
         <p:spPr>
           <a:xfrm>
-            <a:off x="2928926" y="1984610"/>
+            <a:off x="2928926" y="2063280"/>
             <a:ext cx="785818" cy="214314"/>
           </a:xfrm>
           <a:prstGeom prst="roundRect">
@@ -12118,7 +12118,7 @@
         <p:spPr>
           <a:xfrm rot="10800000">
             <a:off x="1998350" y="552235"/>
-            <a:ext cx="930577" cy="769345"/>
+            <a:ext cx="930577" cy="1003609"/>
           </a:xfrm>
           <a:prstGeom prst="line">
             <a:avLst/>
@@ -12189,7 +12189,7 @@
         <p:spPr>
           <a:xfrm rot="10800000">
             <a:off x="1998350" y="552235"/>
-            <a:ext cx="930577" cy="1539533"/>
+            <a:ext cx="930577" cy="1618203"/>
           </a:xfrm>
           <a:prstGeom prst="line">
             <a:avLst/>
@@ -12222,7 +12222,7 @@
         <p:spPr>
           <a:xfrm rot="10800000">
             <a:off x="1998350" y="552234"/>
-            <a:ext cx="930577" cy="1904278"/>
+            <a:ext cx="930577" cy="1982948"/>
           </a:xfrm>
           <a:prstGeom prst="line">
             <a:avLst/>
@@ -12288,7 +12288,7 @@
         </p:nvCxnSpPr>
         <p:spPr>
           <a:xfrm>
-            <a:off x="3714744" y="1321579"/>
+            <a:off x="3714744" y="1555843"/>
             <a:ext cx="717800" cy="0"/>
           </a:xfrm>
           <a:prstGeom prst="line">
@@ -12322,8 +12322,8 @@
         </p:nvCxnSpPr>
         <p:spPr>
           <a:xfrm>
-            <a:off x="3714744" y="1321579"/>
-            <a:ext cx="726350" cy="357190"/>
+            <a:off x="3714744" y="1555843"/>
+            <a:ext cx="726350" cy="288662"/>
           </a:xfrm>
           <a:prstGeom prst="line">
             <a:avLst/>
@@ -12356,7 +12356,7 @@
         </p:nvCxnSpPr>
         <p:spPr>
           <a:xfrm>
-            <a:off x="3714744" y="2091767"/>
+            <a:off x="3714744" y="2170437"/>
             <a:ext cx="714380" cy="0"/>
           </a:xfrm>
           <a:prstGeom prst="line">
@@ -12390,7 +12390,7 @@
         </p:nvCxnSpPr>
         <p:spPr>
           <a:xfrm flipV="1">
-            <a:off x="3713726" y="2455669"/>
+            <a:off x="3713726" y="2534339"/>
             <a:ext cx="715398" cy="843"/>
           </a:xfrm>
           <a:prstGeom prst="line">
@@ -12422,7 +12422,7 @@
         <p:spPr>
           <a:xfrm>
             <a:off x="4286248" y="71414"/>
-            <a:ext cx="4717188" cy="2714644"/>
+            <a:ext cx="4786346" cy="2786082"/>
           </a:xfrm>
           <a:prstGeom prst="roundRect">
             <a:avLst>
@@ -12463,7 +12463,7 @@
         </p:nvSpPr>
         <p:spPr>
           <a:xfrm>
-            <a:off x="8215338" y="1269672"/>
+            <a:off x="8286776" y="1142984"/>
             <a:ext cx="642942" cy="214314"/>
           </a:xfrm>
           <a:prstGeom prst="roundRect">
@@ -12508,8 +12508,8 @@
         </p:nvSpPr>
         <p:spPr>
           <a:xfrm>
-            <a:off x="6143636" y="1214422"/>
-            <a:ext cx="1357200" cy="214314"/>
+            <a:off x="6143636" y="1448686"/>
+            <a:ext cx="1428760" cy="214314"/>
           </a:xfrm>
           <a:prstGeom prst="roundRect">
             <a:avLst/>
@@ -12553,8 +12553,8 @@
         </p:nvSpPr>
         <p:spPr>
           <a:xfrm>
-            <a:off x="6143636" y="2000240"/>
-            <a:ext cx="1357200" cy="214314"/>
+            <a:off x="6143636" y="2078910"/>
+            <a:ext cx="1714512" cy="214314"/>
           </a:xfrm>
           <a:prstGeom prst="roundRect">
             <a:avLst/>
@@ -12643,7 +12643,7 @@
         </p:nvSpPr>
         <p:spPr>
           <a:xfrm>
-            <a:off x="4432544" y="1214422"/>
+            <a:off x="4432544" y="1448686"/>
             <a:ext cx="1357322" cy="214314"/>
           </a:xfrm>
           <a:prstGeom prst="roundRect">
@@ -12688,7 +12688,7 @@
         </p:nvSpPr>
         <p:spPr>
           <a:xfrm>
-            <a:off x="4429124" y="1984610"/>
+            <a:off x="4429124" y="2063280"/>
             <a:ext cx="857256" cy="214314"/>
           </a:xfrm>
           <a:prstGeom prst="roundRect">
@@ -12781,7 +12781,7 @@
         </p:nvSpPr>
         <p:spPr>
           <a:xfrm>
-            <a:off x="4441094" y="1571612"/>
+            <a:off x="4441094" y="1737348"/>
             <a:ext cx="1345352" cy="214314"/>
           </a:xfrm>
           <a:prstGeom prst="roundRect">
@@ -12829,7 +12829,7 @@
         </p:nvSpPr>
         <p:spPr>
           <a:xfrm>
-            <a:off x="6143636" y="1571612"/>
+            <a:off x="6143636" y="1737348"/>
             <a:ext cx="1714512" cy="214314"/>
           </a:xfrm>
           <a:prstGeom prst="roundRect">
@@ -12877,8 +12877,8 @@
         </p:nvSpPr>
         <p:spPr>
           <a:xfrm>
-            <a:off x="6143636" y="2349615"/>
-            <a:ext cx="1357200" cy="214314"/>
+            <a:off x="6143636" y="2428285"/>
+            <a:ext cx="1714512" cy="214314"/>
           </a:xfrm>
           <a:prstGeom prst="roundRect">
             <a:avLst/>
@@ -12925,7 +12925,7 @@
         </p:nvSpPr>
         <p:spPr>
           <a:xfrm>
-            <a:off x="4429124" y="2348512"/>
+            <a:off x="4429124" y="2427182"/>
             <a:ext cx="857256" cy="214314"/>
           </a:xfrm>
           <a:prstGeom prst="roundRect">
@@ -12975,9 +12975,9 @@
           <p:nvPr/>
         </p:nvCxnSpPr>
         <p:spPr>
-          <a:xfrm flipH="1" flipV="1">
-            <a:off x="7500836" y="1321579"/>
-            <a:ext cx="587256" cy="65716"/>
+          <a:xfrm rot="10800000" flipV="1">
+            <a:off x="7572396" y="1260607"/>
+            <a:ext cx="587134" cy="295236"/>
           </a:xfrm>
           <a:prstGeom prst="line">
             <a:avLst/>
@@ -13011,9 +13011,9 @@
           <p:nvPr/>
         </p:nvCxnSpPr>
         <p:spPr>
-          <a:xfrm flipH="1">
-            <a:off x="7500836" y="1602146"/>
-            <a:ext cx="912977" cy="505251"/>
+          <a:xfrm rot="5400000">
+            <a:off x="7812586" y="1505781"/>
+            <a:ext cx="725849" cy="634723"/>
           </a:xfrm>
           <a:prstGeom prst="line">
             <a:avLst/>
@@ -13049,7 +13049,7 @@
         <p:spPr>
           <a:xfrm rot="10800000">
             <a:off x="5757874" y="321447"/>
-            <a:ext cx="2330218" cy="1065848"/>
+            <a:ext cx="2401656" cy="939160"/>
           </a:xfrm>
           <a:prstGeom prst="line">
             <a:avLst/>
@@ -13085,7 +13085,7 @@
         <p:spPr>
           <a:xfrm rot="10800000">
             <a:off x="5770816" y="599385"/>
-            <a:ext cx="2317276" cy="787911"/>
+            <a:ext cx="2388714" cy="661223"/>
           </a:xfrm>
           <a:prstGeom prst="line">
             <a:avLst/>
@@ -13119,9 +13119,9 @@
           <p:nvPr/>
         </p:nvCxnSpPr>
         <p:spPr>
-          <a:xfrm flipH="1">
-            <a:off x="7500836" y="1602146"/>
-            <a:ext cx="912977" cy="854626"/>
+          <a:xfrm rot="5400000">
+            <a:off x="7637898" y="1680469"/>
+            <a:ext cx="1075224" cy="634723"/>
           </a:xfrm>
           <a:prstGeom prst="line">
             <a:avLst/>
@@ -13156,8 +13156,8 @@
         </p:nvCxnSpPr>
         <p:spPr>
           <a:xfrm rot="10800000" flipV="1">
-            <a:off x="7858148" y="1387295"/>
-            <a:ext cx="229944" cy="291474"/>
+            <a:off x="7858148" y="1260607"/>
+            <a:ext cx="301382" cy="583898"/>
           </a:xfrm>
           <a:prstGeom prst="line">
             <a:avLst/>
@@ -13186,13 +13186,12 @@
           <p:cNvPr id="156" name="Gerade Verbindung 155"/>
           <p:cNvCxnSpPr>
             <a:stCxn id="170" idx="1"/>
-            <a:endCxn id="131" idx="3"/>
           </p:cNvCxnSpPr>
           <p:nvPr/>
         </p:nvCxnSpPr>
         <p:spPr>
           <a:xfrm rot="10800000">
-            <a:off x="5789866" y="1321580"/>
+            <a:off x="5789866" y="1555844"/>
             <a:ext cx="226524" cy="2651"/>
           </a:xfrm>
           <a:prstGeom prst="line">
@@ -13222,13 +13221,12 @@
           <p:cNvPr id="157" name="Gerade Verbindung 156"/>
           <p:cNvCxnSpPr>
             <a:stCxn id="175" idx="1"/>
-            <a:endCxn id="133" idx="3"/>
           </p:cNvCxnSpPr>
           <p:nvPr/>
         </p:nvCxnSpPr>
         <p:spPr>
           <a:xfrm rot="10800000">
-            <a:off x="5286381" y="2091768"/>
+            <a:off x="5286381" y="2170438"/>
             <a:ext cx="730213" cy="93"/>
           </a:xfrm>
           <a:prstGeom prst="line">
@@ -13258,13 +13256,12 @@
           <p:cNvPr id="160" name="Gerade Verbindung 159"/>
           <p:cNvCxnSpPr>
             <a:stCxn id="176" idx="1"/>
-            <a:endCxn id="145" idx="3"/>
           </p:cNvCxnSpPr>
           <p:nvPr/>
         </p:nvCxnSpPr>
         <p:spPr>
           <a:xfrm rot="10800000">
-            <a:off x="5286380" y="2455670"/>
+            <a:off x="5286380" y="2534340"/>
             <a:ext cx="722398" cy="3349"/>
           </a:xfrm>
           <a:prstGeom prst="line">
@@ -13297,7 +13294,7 @@
         </p:nvSpPr>
         <p:spPr>
           <a:xfrm>
-            <a:off x="7358082" y="2404277"/>
+            <a:off x="7429520" y="2500306"/>
             <a:ext cx="1571636" cy="381781"/>
           </a:xfrm>
           <a:prstGeom prst="rect">
@@ -13336,7 +13333,7 @@
         </p:nvSpPr>
         <p:spPr>
           <a:xfrm rot="23940000">
-            <a:off x="8393796" y="1506180"/>
+            <a:off x="8472854" y="1364252"/>
             <a:ext cx="108000" cy="108000"/>
           </a:xfrm>
           <a:prstGeom prst="triangle">
@@ -13375,7 +13372,7 @@
         </p:nvSpPr>
         <p:spPr>
           <a:xfrm rot="5400000" flipH="1">
-            <a:off x="8088092" y="1333295"/>
+            <a:off x="8159530" y="1206607"/>
             <a:ext cx="108000" cy="108000"/>
           </a:xfrm>
           <a:prstGeom prst="triangle">
@@ -13414,7 +13411,7 @@
         </p:nvSpPr>
         <p:spPr>
           <a:xfrm>
-            <a:off x="6016390" y="1270230"/>
+            <a:off x="6016390" y="1504494"/>
             <a:ext cx="108000" cy="108000"/>
           </a:xfrm>
           <a:prstGeom prst="diamond">
@@ -13460,7 +13457,7 @@
         </p:nvSpPr>
         <p:spPr>
           <a:xfrm>
-            <a:off x="6016593" y="2037860"/>
+            <a:off x="6016593" y="2116530"/>
             <a:ext cx="108000" cy="108000"/>
           </a:xfrm>
           <a:prstGeom prst="diamond">
@@ -13506,7 +13503,7 @@
         </p:nvSpPr>
         <p:spPr>
           <a:xfrm>
-            <a:off x="6008778" y="2405018"/>
+            <a:off x="6008778" y="2483688"/>
             <a:ext cx="108000" cy="108000"/>
           </a:xfrm>
           <a:prstGeom prst="diamond">
@@ -13586,7 +13583,7 @@
         </p:nvCxnSpPr>
         <p:spPr>
           <a:xfrm>
-            <a:off x="7617026" y="912152"/>
+            <a:off x="7441170" y="912152"/>
             <a:ext cx="285752" cy="0"/>
           </a:xfrm>
           <a:prstGeom prst="line">
@@ -13617,7 +13614,7 @@
         </p:nvSpPr>
         <p:spPr>
           <a:xfrm>
-            <a:off x="7898400" y="778800"/>
+            <a:off x="7722544" y="778800"/>
             <a:ext cx="982961" cy="230832"/>
           </a:xfrm>
           <a:prstGeom prst="rect">
@@ -13655,7 +13652,7 @@
         </p:nvSpPr>
         <p:spPr>
           <a:xfrm>
-            <a:off x="7898400" y="483524"/>
+            <a:off x="7722544" y="483524"/>
             <a:ext cx="720069" cy="230832"/>
           </a:xfrm>
           <a:prstGeom prst="rect">
@@ -13685,7 +13682,7 @@
         </p:nvSpPr>
         <p:spPr>
           <a:xfrm>
-            <a:off x="7617026" y="372555"/>
+            <a:off x="7441170" y="372555"/>
             <a:ext cx="285752" cy="110969"/>
           </a:xfrm>
           <a:prstGeom prst="roundRect">
@@ -13732,7 +13729,7 @@
         </p:nvSpPr>
         <p:spPr>
           <a:xfrm>
-            <a:off x="7617026" y="190148"/>
+            <a:off x="7441170" y="190148"/>
             <a:ext cx="285752" cy="110969"/>
           </a:xfrm>
           <a:prstGeom prst="roundRect">
@@ -13778,7 +13775,7 @@
         </p:nvSpPr>
         <p:spPr>
           <a:xfrm>
-            <a:off x="7898400" y="308741"/>
+            <a:off x="7722544" y="308741"/>
             <a:ext cx="1350050" cy="230832"/>
           </a:xfrm>
           <a:prstGeom prst="rect">
@@ -13820,7 +13817,7 @@
         </p:nvSpPr>
         <p:spPr>
           <a:xfrm>
-            <a:off x="7898400" y="126334"/>
+            <a:off x="7722544" y="126334"/>
             <a:ext cx="1098378" cy="230832"/>
           </a:xfrm>
           <a:prstGeom prst="rect">
@@ -13862,7 +13859,7 @@
         </p:nvGrpSpPr>
         <p:grpSpPr>
           <a:xfrm>
-            <a:off x="7612498" y="577323"/>
+            <a:off x="7436642" y="577323"/>
             <a:ext cx="290280" cy="71438"/>
             <a:chOff x="209754" y="1071546"/>
             <a:chExt cx="290280" cy="71438"/>
@@ -13958,7 +13955,7 @@
         </p:nvCxnSpPr>
         <p:spPr>
           <a:xfrm>
-            <a:off x="7714864" y="776523"/>
+            <a:off x="7539008" y="776523"/>
             <a:ext cx="198000" cy="0"/>
           </a:xfrm>
           <a:prstGeom prst="line">
@@ -13993,7 +13990,7 @@
         </p:nvSpPr>
         <p:spPr>
           <a:xfrm>
-            <a:off x="7617026" y="729745"/>
+            <a:off x="7441170" y="729745"/>
             <a:ext cx="90000" cy="90000"/>
           </a:xfrm>
           <a:prstGeom prst="diamond">
@@ -14039,7 +14036,7 @@
         </p:nvSpPr>
         <p:spPr>
           <a:xfrm>
-            <a:off x="7898400" y="635924"/>
+            <a:off x="7722544" y="635924"/>
             <a:ext cx="798617" cy="230832"/>
           </a:xfrm>
           <a:prstGeom prst="rect">
@@ -14066,13 +14063,12 @@
           <p:cNvPr id="109" name="Gerade Verbindung 108"/>
           <p:cNvCxnSpPr>
             <a:stCxn id="110" idx="1"/>
-            <a:endCxn id="142" idx="3"/>
           </p:cNvCxnSpPr>
           <p:nvPr/>
         </p:nvCxnSpPr>
         <p:spPr>
           <a:xfrm rot="10800000" flipV="1">
-            <a:off x="5786447" y="1676117"/>
+            <a:off x="5786447" y="1841853"/>
             <a:ext cx="222129" cy="2651"/>
           </a:xfrm>
           <a:prstGeom prst="line">
@@ -14105,7 +14101,7 @@
         </p:nvSpPr>
         <p:spPr>
           <a:xfrm>
-            <a:off x="6008575" y="1622118"/>
+            <a:off x="6008575" y="1787854"/>
             <a:ext cx="108000" cy="108000"/>
           </a:xfrm>
           <a:prstGeom prst="diamond">
@@ -14151,8 +14147,8 @@
         </p:nvSpPr>
         <p:spPr>
           <a:xfrm>
-            <a:off x="6139076" y="908720"/>
-            <a:ext cx="1357200" cy="214314"/>
+            <a:off x="6139076" y="1142984"/>
+            <a:ext cx="1428760" cy="214314"/>
           </a:xfrm>
           <a:prstGeom prst="roundRect">
             <a:avLst/>
@@ -14199,7 +14195,7 @@
         </p:nvSpPr>
         <p:spPr>
           <a:xfrm>
-            <a:off x="4427984" y="908720"/>
+            <a:off x="4427984" y="1142984"/>
             <a:ext cx="1357322" cy="214314"/>
           </a:xfrm>
           <a:prstGeom prst="roundRect">
@@ -14244,13 +14240,12 @@
           <p:cNvPr id="64" name="Gerade Verbindung 63"/>
           <p:cNvCxnSpPr>
             <a:stCxn id="65" idx="1"/>
-            <a:endCxn id="63" idx="3"/>
           </p:cNvCxnSpPr>
           <p:nvPr/>
         </p:nvCxnSpPr>
         <p:spPr>
           <a:xfrm rot="10800000">
-            <a:off x="5785306" y="1015878"/>
+            <a:off x="5785306" y="1250142"/>
             <a:ext cx="226524" cy="2651"/>
           </a:xfrm>
           <a:prstGeom prst="line">
@@ -14283,7 +14278,7 @@
         </p:nvSpPr>
         <p:spPr>
           <a:xfrm>
-            <a:off x="6011830" y="964528"/>
+            <a:off x="6011830" y="1198792"/>
             <a:ext cx="108000" cy="108000"/>
           </a:xfrm>
           <a:prstGeom prst="diamond">
@@ -14332,7 +14327,7 @@
         </p:nvCxnSpPr>
         <p:spPr>
           <a:xfrm flipV="1">
-            <a:off x="3714744" y="1015877"/>
+            <a:off x="3714744" y="1250141"/>
             <a:ext cx="713240" cy="305702"/>
           </a:xfrm>
           <a:prstGeom prst="line">
@@ -14352,6 +14347,42 @@
           </a:effectRef>
           <a:fontRef idx="minor">
             <a:schemeClr val="tx1"/>
+          </a:fontRef>
+        </p:style>
+      </p:cxnSp>
+      <p:cxnSp>
+        <p:nvCxnSpPr>
+          <p:cNvPr id="69" name="Gerade Verbindung 68"/>
+          <p:cNvCxnSpPr>
+            <a:stCxn id="169" idx="3"/>
+            <a:endCxn id="62" idx="3"/>
+          </p:cNvCxnSpPr>
+          <p:nvPr/>
+        </p:nvCxnSpPr>
+        <p:spPr>
+          <a:xfrm rot="10800000">
+            <a:off x="7567836" y="1250141"/>
+            <a:ext cx="591694" cy="10466"/>
+          </a:xfrm>
+          <a:prstGeom prst="line">
+            <a:avLst/>
+          </a:prstGeom>
+          <a:ln>
+            <a:headEnd type="none"/>
+          </a:ln>
+        </p:spPr>
+        <p:style>
+          <a:lnRef idx="2">
+            <a:schemeClr val="accent3"/>
+          </a:lnRef>
+          <a:fillRef idx="1">
+            <a:schemeClr val="lt1"/>
+          </a:fillRef>
+          <a:effectRef idx="0">
+            <a:schemeClr val="accent3"/>
+          </a:effectRef>
+          <a:fontRef idx="minor">
+            <a:schemeClr val="dk1"/>
           </a:fontRef>
         </p:style>
       </p:cxnSp>

</xml_diff>

<commit_message>
Method Publication: Updated Figures.
</commit_message>
<xml_diff>
--- a/doc/publications/2012-04_CMSB2012/figures/Conversion.pptx
+++ b/doc/publications/2012-04_CMSB2012/figures/Conversion.pptx
@@ -12255,7 +12255,7 @@
         <p:spPr>
           <a:xfrm>
             <a:off x="2452230" y="321447"/>
-            <a:ext cx="1976894" cy="0"/>
+            <a:ext cx="1975770" cy="0"/>
           </a:xfrm>
           <a:prstGeom prst="line">
             <a:avLst/>
@@ -12289,7 +12289,7 @@
         <p:spPr>
           <a:xfrm>
             <a:off x="3714744" y="1555843"/>
-            <a:ext cx="717800" cy="0"/>
+            <a:ext cx="713256" cy="0"/>
           </a:xfrm>
           <a:prstGeom prst="line">
             <a:avLst/>
@@ -12323,7 +12323,7 @@
         <p:spPr>
           <a:xfrm>
             <a:off x="3714744" y="1555843"/>
-            <a:ext cx="726350" cy="288662"/>
+            <a:ext cx="713256" cy="288662"/>
           </a:xfrm>
           <a:prstGeom prst="line">
             <a:avLst/>
@@ -12357,7 +12357,7 @@
         <p:spPr>
           <a:xfrm>
             <a:off x="3714744" y="2170437"/>
-            <a:ext cx="714380" cy="0"/>
+            <a:ext cx="713256" cy="0"/>
           </a:xfrm>
           <a:prstGeom prst="line">
             <a:avLst/>
@@ -12391,7 +12391,7 @@
         <p:spPr>
           <a:xfrm flipV="1">
             <a:off x="3713726" y="2534339"/>
-            <a:ext cx="715398" cy="843"/>
+            <a:ext cx="714274" cy="843"/>
           </a:xfrm>
           <a:prstGeom prst="line">
             <a:avLst/>
@@ -12508,7 +12508,7 @@
         </p:nvSpPr>
         <p:spPr>
           <a:xfrm>
-            <a:off x="6143636" y="1448686"/>
+            <a:off x="6145200" y="1448686"/>
             <a:ext cx="1428760" cy="214314"/>
           </a:xfrm>
           <a:prstGeom prst="roundRect">
@@ -12553,7 +12553,7 @@
         </p:nvSpPr>
         <p:spPr>
           <a:xfrm>
-            <a:off x="6143636" y="2078910"/>
+            <a:off x="6145200" y="2078910"/>
             <a:ext cx="1714512" cy="214314"/>
           </a:xfrm>
           <a:prstGeom prst="roundRect">
@@ -12598,7 +12598,7 @@
         </p:nvSpPr>
         <p:spPr>
           <a:xfrm>
-            <a:off x="4429124" y="214290"/>
+            <a:off x="4428000" y="214290"/>
             <a:ext cx="1328750" cy="214314"/>
           </a:xfrm>
           <a:prstGeom prst="roundRect">
@@ -12643,7 +12643,7 @@
         </p:nvSpPr>
         <p:spPr>
           <a:xfrm>
-            <a:off x="4432544" y="1448686"/>
+            <a:off x="4428000" y="1448686"/>
             <a:ext cx="1357322" cy="214314"/>
           </a:xfrm>
           <a:prstGeom prst="roundRect">
@@ -12688,7 +12688,7 @@
         </p:nvSpPr>
         <p:spPr>
           <a:xfrm>
-            <a:off x="4429124" y="2063280"/>
+            <a:off x="4428000" y="2063280"/>
             <a:ext cx="857256" cy="214314"/>
           </a:xfrm>
           <a:prstGeom prst="roundRect">
@@ -12733,7 +12733,7 @@
         </p:nvSpPr>
         <p:spPr>
           <a:xfrm>
-            <a:off x="4442066" y="492227"/>
+            <a:off x="4428000" y="492227"/>
             <a:ext cx="1328750" cy="214314"/>
           </a:xfrm>
           <a:prstGeom prst="roundRect">
@@ -12781,7 +12781,7 @@
         </p:nvSpPr>
         <p:spPr>
           <a:xfrm>
-            <a:off x="4441094" y="1737348"/>
+            <a:off x="4428000" y="1737348"/>
             <a:ext cx="1345352" cy="214314"/>
           </a:xfrm>
           <a:prstGeom prst="roundRect">
@@ -12829,7 +12829,7 @@
         </p:nvSpPr>
         <p:spPr>
           <a:xfrm>
-            <a:off x="6143636" y="1737348"/>
+            <a:off x="6145200" y="1737348"/>
             <a:ext cx="1714512" cy="214314"/>
           </a:xfrm>
           <a:prstGeom prst="roundRect">
@@ -12877,7 +12877,7 @@
         </p:nvSpPr>
         <p:spPr>
           <a:xfrm>
-            <a:off x="6143636" y="2428285"/>
+            <a:off x="6145200" y="2428285"/>
             <a:ext cx="1714512" cy="214314"/>
           </a:xfrm>
           <a:prstGeom prst="roundRect">
@@ -12925,7 +12925,7 @@
         </p:nvSpPr>
         <p:spPr>
           <a:xfrm>
-            <a:off x="4429124" y="2427182"/>
+            <a:off x="4428000" y="2427182"/>
             <a:ext cx="857256" cy="214314"/>
           </a:xfrm>
           <a:prstGeom prst="roundRect">
@@ -12975,9 +12975,9 @@
           <p:nvPr/>
         </p:nvCxnSpPr>
         <p:spPr>
-          <a:xfrm rot="10800000" flipV="1">
-            <a:off x="7572396" y="1260607"/>
-            <a:ext cx="587134" cy="295236"/>
+          <a:xfrm flipH="1">
+            <a:off x="7573960" y="1260607"/>
+            <a:ext cx="585570" cy="295236"/>
           </a:xfrm>
           <a:prstGeom prst="line">
             <a:avLst/>
@@ -13011,9 +13011,9 @@
           <p:nvPr/>
         </p:nvCxnSpPr>
         <p:spPr>
-          <a:xfrm rot="5400000">
-            <a:off x="7812586" y="1505781"/>
-            <a:ext cx="725849" cy="634723"/>
+          <a:xfrm flipH="1">
+            <a:off x="7859712" y="1460218"/>
+            <a:ext cx="633159" cy="725849"/>
           </a:xfrm>
           <a:prstGeom prst="line">
             <a:avLst/>
@@ -13047,9 +13047,9 @@
           <p:nvPr/>
         </p:nvCxnSpPr>
         <p:spPr>
-          <a:xfrm rot="10800000">
-            <a:off x="5757874" y="321447"/>
-            <a:ext cx="2401656" cy="939160"/>
+          <a:xfrm flipH="1" flipV="1">
+            <a:off x="5756750" y="321447"/>
+            <a:ext cx="2402780" cy="939160"/>
           </a:xfrm>
           <a:prstGeom prst="line">
             <a:avLst/>
@@ -13083,9 +13083,9 @@
           <p:nvPr/>
         </p:nvCxnSpPr>
         <p:spPr>
-          <a:xfrm rot="10800000">
-            <a:off x="5770816" y="599385"/>
-            <a:ext cx="2388714" cy="661223"/>
+          <a:xfrm flipH="1" flipV="1">
+            <a:off x="5756750" y="599384"/>
+            <a:ext cx="2402780" cy="661223"/>
           </a:xfrm>
           <a:prstGeom prst="line">
             <a:avLst/>
@@ -13119,9 +13119,9 @@
           <p:nvPr/>
         </p:nvCxnSpPr>
         <p:spPr>
-          <a:xfrm rot="5400000">
-            <a:off x="7637898" y="1680469"/>
-            <a:ext cx="1075224" cy="634723"/>
+          <a:xfrm flipH="1">
+            <a:off x="7859712" y="1460218"/>
+            <a:ext cx="633159" cy="1075224"/>
           </a:xfrm>
           <a:prstGeom prst="line">
             <a:avLst/>
@@ -13155,9 +13155,9 @@
           <p:nvPr/>
         </p:nvCxnSpPr>
         <p:spPr>
-          <a:xfrm rot="10800000" flipV="1">
-            <a:off x="7858148" y="1260607"/>
-            <a:ext cx="301382" cy="583898"/>
+          <a:xfrm flipH="1">
+            <a:off x="7859712" y="1260607"/>
+            <a:ext cx="299818" cy="583898"/>
           </a:xfrm>
           <a:prstGeom prst="line">
             <a:avLst/>
@@ -13553,7 +13553,7 @@
         <p:spPr>
           <a:xfrm>
             <a:off x="2452230" y="321447"/>
-            <a:ext cx="1989836" cy="277937"/>
+            <a:ext cx="1975770" cy="277937"/>
           </a:xfrm>
           <a:prstGeom prst="line">
             <a:avLst/>
@@ -14147,7 +14147,7 @@
         </p:nvSpPr>
         <p:spPr>
           <a:xfrm>
-            <a:off x="6139076" y="1142984"/>
+            <a:off x="6145200" y="1142984"/>
             <a:ext cx="1428760" cy="214314"/>
           </a:xfrm>
           <a:prstGeom prst="roundRect">
@@ -14195,7 +14195,7 @@
         </p:nvSpPr>
         <p:spPr>
           <a:xfrm>
-            <a:off x="4427984" y="1142984"/>
+            <a:off x="4428000" y="1142984"/>
             <a:ext cx="1357322" cy="214314"/>
           </a:xfrm>
           <a:prstGeom prst="roundRect">
@@ -14328,7 +14328,7 @@
         <p:spPr>
           <a:xfrm flipV="1">
             <a:off x="3714744" y="1250141"/>
-            <a:ext cx="713240" cy="305702"/>
+            <a:ext cx="713256" cy="305702"/>
           </a:xfrm>
           <a:prstGeom prst="line">
             <a:avLst/>
@@ -14360,9 +14360,9 @@
           <p:nvPr/>
         </p:nvCxnSpPr>
         <p:spPr>
-          <a:xfrm rot="10800000">
-            <a:off x="7567836" y="1250141"/>
-            <a:ext cx="591694" cy="10466"/>
+          <a:xfrm flipH="1" flipV="1">
+            <a:off x="7573960" y="1250141"/>
+            <a:ext cx="585570" cy="10466"/>
           </a:xfrm>
           <a:prstGeom prst="line">
             <a:avLst/>

</xml_diff>